<commit_message>
Application of AI PPT Updates
</commit_message>
<xml_diff>
--- a/Application of AI/Task/Week 1/Week 1 Updates.pptx
+++ b/Application of AI/Task/Week 1/Week 1 Updates.pptx
@@ -106,6 +106,11 @@
       </a:defRPr>
     </a:lvl9pPr>
   </p:defaultTextStyle>
+  <p:extLst>
+    <p:ext uri="{EFAFB233-063F-42B5-8137-9DF3F51BA10A}">
+      <p15:sldGuideLst xmlns:p15="http://schemas.microsoft.com/office/powerpoint/2012/main"/>
+    </p:ext>
+  </p:extLst>
 </p:presentation>
 </file>
 
@@ -3406,10 +3411,10 @@
       </p:grpSpPr>
       <p:pic>
         <p:nvPicPr>
-          <p:cNvPr id="5" name="Picture 4">
-            <a:extLst>
-              <a:ext uri="{FF2B5EF4-FFF2-40B4-BE49-F238E27FC236}">
-                <a16:creationId xmlns:a16="http://schemas.microsoft.com/office/drawing/2014/main" id="{D2B56455-FD46-0D3E-9919-5318DD9ABC51}"/>
+          <p:cNvPr id="3" name="Picture 2">
+            <a:extLst>
+              <a:ext uri="{FF2B5EF4-FFF2-40B4-BE49-F238E27FC236}">
+                <a16:creationId xmlns:a16="http://schemas.microsoft.com/office/drawing/2014/main" id="{CE14008D-3925-82E9-2C26-D99F4D29E266}"/>
               </a:ext>
             </a:extLst>
           </p:cNvPr>
@@ -3427,7 +3432,7 @@
         <p:spPr>
           <a:xfrm>
             <a:off x="0" y="0"/>
-            <a:ext cx="12192000" cy="7013050"/>
+            <a:ext cx="12192000" cy="6858000"/>
           </a:xfrm>
           <a:prstGeom prst="rect">
             <a:avLst/>

</xml_diff>